<commit_message>
+ Add more designs
</commit_message>
<xml_diff>
--- a/designs.pptx
+++ b/designs.pptx
@@ -3131,14 +3131,124 @@
       </p:grpSpPr>
       <p:sp>
         <p:nvSpPr>
+          <p:cNvPr id="114" name="文本框 113"/>
+          <p:cNvSpPr txBox="1"/>
+          <p:nvPr/>
+        </p:nvSpPr>
+        <p:spPr>
+          <a:xfrm>
+            <a:off x="11001039" y="22705"/>
+            <a:ext cx="864000" cy="216000"/>
+          </a:xfrm>
+          <a:prstGeom prst="rect">
+            <a:avLst/>
+          </a:prstGeom>
+          <a:solidFill>
+            <a:schemeClr val="bg1"/>
+          </a:solidFill>
+          <a:ln w="12700">
+            <a:noFill/>
+          </a:ln>
+        </p:spPr>
+        <p:txBody>
+          <a:bodyPr wrap="square" rtlCol="0">
+            <a:spAutoFit/>
+          </a:bodyPr>
+          <a:lstStyle/>
+          <a:p>
+            <a:endParaRPr lang="zh-CN" altLang="en-US" sz="1600" b="1" dirty="0">
+              <a:latin typeface="等线" panose="02010600030101010101" pitchFamily="2" charset="-122"/>
+              <a:ea typeface="等线" panose="02010600030101010101" pitchFamily="2" charset="-122"/>
+            </a:endParaRPr>
+          </a:p>
+        </p:txBody>
+      </p:sp>
+      <p:sp>
+        <p:nvSpPr>
+          <p:cNvPr id="111" name="文本框 110"/>
+          <p:cNvSpPr txBox="1"/>
+          <p:nvPr/>
+        </p:nvSpPr>
+        <p:spPr>
+          <a:xfrm>
+            <a:off x="6767347" y="31159"/>
+            <a:ext cx="864000" cy="216000"/>
+          </a:xfrm>
+          <a:prstGeom prst="rect">
+            <a:avLst/>
+          </a:prstGeom>
+          <a:solidFill>
+            <a:schemeClr val="tx1"/>
+          </a:solidFill>
+          <a:ln w="12700">
+            <a:noFill/>
+          </a:ln>
+        </p:spPr>
+        <p:txBody>
+          <a:bodyPr wrap="square" rtlCol="0">
+            <a:spAutoFit/>
+          </a:bodyPr>
+          <a:lstStyle/>
+          <a:p>
+            <a:endParaRPr lang="zh-CN" altLang="en-US" sz="1600" b="1" dirty="0">
+              <a:latin typeface="等线" panose="02010600030101010101" pitchFamily="2" charset="-122"/>
+              <a:ea typeface="等线" panose="02010600030101010101" pitchFamily="2" charset="-122"/>
+            </a:endParaRPr>
+          </a:p>
+        </p:txBody>
+      </p:sp>
+      <p:sp>
+        <p:nvSpPr>
+          <p:cNvPr id="77" name="文本框 76"/>
+          <p:cNvSpPr txBox="1"/>
+          <p:nvPr/>
+        </p:nvSpPr>
+        <p:spPr>
+          <a:xfrm>
+            <a:off x="6709269" y="-27119"/>
+            <a:ext cx="506087" cy="338554"/>
+          </a:xfrm>
+          <a:prstGeom prst="rect">
+            <a:avLst/>
+          </a:prstGeom>
+          <a:noFill/>
+          <a:ln>
+            <a:noFill/>
+          </a:ln>
+        </p:spPr>
+        <p:txBody>
+          <a:bodyPr wrap="square" rtlCol="0">
+            <a:spAutoFit/>
+          </a:bodyPr>
+          <a:lstStyle/>
+          <a:p>
+            <a:pPr algn="r"/>
+            <a:r>
+              <a:rPr lang="en-US" altLang="zh-CN" sz="1600" b="1" dirty="0" smtClean="0">
+                <a:solidFill>
+                  <a:srgbClr val="66FF66"/>
+                </a:solidFill>
+              </a:rPr>
+              <a:t>315</a:t>
+            </a:r>
+            <a:endParaRPr lang="zh-CN" altLang="en-US" sz="1600" b="1" dirty="0">
+              <a:solidFill>
+                <a:srgbClr val="66FF66"/>
+              </a:solidFill>
+            </a:endParaRPr>
+          </a:p>
+        </p:txBody>
+      </p:sp>
+      <p:sp>
+        <p:nvSpPr>
           <p:cNvPr id="83" name="矩形 82"/>
           <p:cNvSpPr/>
           <p:nvPr/>
         </p:nvSpPr>
         <p:spPr>
           <a:xfrm>
-            <a:off x="4818382" y="68972"/>
-            <a:ext cx="1422270" cy="2830676"/>
+            <a:off x="4627542" y="53721"/>
+            <a:ext cx="1422270" cy="2845925"/>
           </a:xfrm>
           <a:prstGeom prst="rect">
             <a:avLst/>
@@ -3189,7 +3299,7 @@
         </p:nvSpPr>
         <p:spPr>
           <a:xfrm>
-            <a:off x="2528835" y="39258"/>
+            <a:off x="2325172" y="39258"/>
             <a:ext cx="1977603" cy="2860389"/>
           </a:xfrm>
           <a:prstGeom prst="rect">
@@ -3241,8 +3351,8 @@
         </p:nvSpPr>
         <p:spPr>
           <a:xfrm>
-            <a:off x="6814527" y="275163"/>
-            <a:ext cx="5065718" cy="1872287"/>
+            <a:off x="6782937" y="302459"/>
+            <a:ext cx="5097308" cy="1872287"/>
           </a:xfrm>
           <a:prstGeom prst="rect">
             <a:avLst/>
@@ -3762,8 +3872,8 @@
         </p:nvSpPr>
         <p:spPr>
           <a:xfrm>
-            <a:off x="2622278" y="1795756"/>
-            <a:ext cx="1379272" cy="338554"/>
+            <a:off x="2418615" y="1795756"/>
+            <a:ext cx="1592304" cy="338554"/>
           </a:xfrm>
           <a:prstGeom prst="rect">
             <a:avLst/>
@@ -4051,7 +4161,7 @@
             <a:avLst/>
           </a:prstGeom>
           <a:solidFill>
-            <a:srgbClr val="9C47A3"/>
+            <a:srgbClr val="BB71C1"/>
           </a:solidFill>
           <a:ln w="25400">
             <a:solidFill>
@@ -4087,8 +4197,8 @@
         </p:nvSpPr>
         <p:spPr>
           <a:xfrm>
-            <a:off x="2628043" y="147839"/>
-            <a:ext cx="1379272" cy="338554"/>
+            <a:off x="2424379" y="147839"/>
+            <a:ext cx="1590229" cy="338554"/>
           </a:xfrm>
           <a:prstGeom prst="rect">
             <a:avLst/>
@@ -4132,8 +4242,8 @@
         </p:nvSpPr>
         <p:spPr>
           <a:xfrm>
-            <a:off x="2622278" y="645551"/>
-            <a:ext cx="1379272" cy="338554"/>
+            <a:off x="2418614" y="645551"/>
+            <a:ext cx="1595993" cy="338554"/>
           </a:xfrm>
           <a:prstGeom prst="rect">
             <a:avLst/>
@@ -4175,8 +4285,8 @@
         </p:nvSpPr>
         <p:spPr>
           <a:xfrm>
-            <a:off x="2628043" y="1273536"/>
-            <a:ext cx="1379272" cy="338554"/>
+            <a:off x="2424379" y="1273536"/>
+            <a:ext cx="1587671" cy="338554"/>
           </a:xfrm>
           <a:prstGeom prst="rect">
             <a:avLst/>
@@ -4274,7 +4384,7 @@
         <p:spPr>
           <a:xfrm>
             <a:off x="46079" y="169454"/>
-            <a:ext cx="864000" cy="400110"/>
+            <a:ext cx="864000" cy="369332"/>
           </a:xfrm>
           <a:prstGeom prst="rect">
             <a:avLst/>
@@ -4296,13 +4406,13 @@
           <a:p>
             <a:pPr algn="ctr"/>
             <a:r>
-              <a:rPr lang="en-US" altLang="zh-CN" sz="2000" b="1" dirty="0" smtClean="0">
+              <a:rPr lang="en-US" altLang="zh-CN" b="1" dirty="0" smtClean="0">
                 <a:latin typeface="等线" panose="02010600030101010101" pitchFamily="2" charset="-122"/>
                 <a:ea typeface="等线" panose="02010600030101010101" pitchFamily="2" charset="-122"/>
               </a:rPr>
               <a:t>PLAY</a:t>
             </a:r>
-            <a:endParaRPr lang="zh-CN" altLang="en-US" sz="2000" b="1" dirty="0">
+            <a:endParaRPr lang="zh-CN" altLang="en-US" b="1" dirty="0">
               <a:latin typeface="等线" panose="02010600030101010101" pitchFamily="2" charset="-122"/>
               <a:ea typeface="等线" panose="02010600030101010101" pitchFamily="2" charset="-122"/>
             </a:endParaRPr>
@@ -4317,8 +4427,8 @@
         </p:nvSpPr>
         <p:spPr>
           <a:xfrm>
-            <a:off x="923061" y="169454"/>
-            <a:ext cx="864000" cy="400110"/>
+            <a:off x="922823" y="169454"/>
+            <a:ext cx="864000" cy="369332"/>
           </a:xfrm>
           <a:prstGeom prst="rect">
             <a:avLst/>
@@ -4326,7 +4436,7 @@
           <a:solidFill>
             <a:srgbClr val="66FF66"/>
           </a:solidFill>
-          <a:ln w="50800">
+          <a:ln w="25400">
             <a:solidFill>
               <a:schemeClr val="tx1"/>
             </a:solidFill>
@@ -4350,10 +4460,10 @@
           <a:p>
             <a:pPr algn="ctr"/>
             <a:r>
-              <a:rPr lang="en-US" altLang="zh-CN" dirty="0"/>
+              <a:rPr lang="en-US" altLang="zh-CN" sz="1800" dirty="0"/>
               <a:t>EDIT</a:t>
             </a:r>
-            <a:endParaRPr lang="zh-CN" altLang="en-US" dirty="0"/>
+            <a:endParaRPr lang="zh-CN" altLang="en-US" sz="1800" dirty="0"/>
           </a:p>
         </p:txBody>
       </p:sp>
@@ -4365,8 +4475,8 @@
         </p:nvSpPr>
         <p:spPr>
           <a:xfrm>
-            <a:off x="4897443" y="170208"/>
-            <a:ext cx="864000" cy="338554"/>
+            <a:off x="4706603" y="154958"/>
+            <a:ext cx="1117164" cy="338554"/>
           </a:xfrm>
           <a:prstGeom prst="rect">
             <a:avLst/>
@@ -4408,8 +4518,8 @@
         </p:nvSpPr>
         <p:spPr>
           <a:xfrm>
-            <a:off x="4897443" y="673666"/>
-            <a:ext cx="864000" cy="338554"/>
+            <a:off x="4706602" y="658416"/>
+            <a:ext cx="1104151" cy="338554"/>
           </a:xfrm>
           <a:prstGeom prst="rect">
             <a:avLst/>
@@ -4451,8 +4561,8 @@
         </p:nvSpPr>
         <p:spPr>
           <a:xfrm>
-            <a:off x="4896839" y="1184721"/>
-            <a:ext cx="864000" cy="338554"/>
+            <a:off x="4705999" y="1169471"/>
+            <a:ext cx="1104754" cy="338554"/>
           </a:xfrm>
           <a:prstGeom prst="rect">
             <a:avLst/>
@@ -4494,8 +4604,8 @@
         </p:nvSpPr>
         <p:spPr>
           <a:xfrm>
-            <a:off x="4896839" y="1717929"/>
-            <a:ext cx="864000" cy="338554"/>
+            <a:off x="4705999" y="1702679"/>
+            <a:ext cx="1104754" cy="338554"/>
           </a:xfrm>
           <a:prstGeom prst="rect">
             <a:avLst/>
@@ -4541,7 +4651,7 @@
         <p:spPr>
           <a:xfrm flipV="1">
             <a:off x="1800665" y="814828"/>
-            <a:ext cx="821613" cy="1235134"/>
+            <a:ext cx="617949" cy="1235134"/>
           </a:xfrm>
           <a:prstGeom prst="curvedConnector3">
             <a:avLst/>
@@ -4811,8 +4921,8 @@
         </p:nvSpPr>
         <p:spPr>
           <a:xfrm>
-            <a:off x="45457" y="569564"/>
-            <a:ext cx="864000" cy="400110"/>
+            <a:off x="46079" y="557424"/>
+            <a:ext cx="864000" cy="369332"/>
           </a:xfrm>
           <a:prstGeom prst="rect">
             <a:avLst/>
@@ -4843,10 +4953,10 @@
           </a:lstStyle>
           <a:p>
             <a:r>
-              <a:rPr lang="en-US" altLang="zh-CN" dirty="0" smtClean="0"/>
+              <a:rPr lang="en-US" altLang="zh-CN" sz="1800" dirty="0" smtClean="0"/>
               <a:t>REC</a:t>
             </a:r>
-            <a:endParaRPr lang="zh-CN" altLang="en-US" dirty="0"/>
+            <a:endParaRPr lang="zh-CN" altLang="en-US" sz="1800" dirty="0"/>
           </a:p>
         </p:txBody>
       </p:sp>
@@ -4858,8 +4968,8 @@
         </p:nvSpPr>
         <p:spPr>
           <a:xfrm>
-            <a:off x="4880086" y="2302526"/>
-            <a:ext cx="864000" cy="338554"/>
+            <a:off x="4689246" y="2287276"/>
+            <a:ext cx="1098328" cy="338554"/>
           </a:xfrm>
           <a:prstGeom prst="rect">
             <a:avLst/>
@@ -4880,11 +4990,11 @@
           <a:lstStyle/>
           <a:p>
             <a:r>
-              <a:rPr lang="en-US" altLang="zh-CN" sz="1600" b="1" dirty="0" err="1" smtClean="0">
+              <a:rPr lang="en-US" altLang="zh-CN" sz="1600" b="1" dirty="0" smtClean="0">
                 <a:latin typeface="等线" panose="02010600030101010101" pitchFamily="2" charset="-122"/>
                 <a:ea typeface="等线" panose="02010600030101010101" pitchFamily="2" charset="-122"/>
               </a:rPr>
-              <a:t>wpn</a:t>
+              <a:t>waypoint</a:t>
             </a:r>
             <a:endParaRPr lang="zh-CN" altLang="en-US" sz="1600" b="1" dirty="0">
               <a:latin typeface="等线" panose="02010600030101010101" pitchFamily="2" charset="-122"/>
@@ -4901,8 +5011,8 @@
         </p:nvSpPr>
         <p:spPr>
           <a:xfrm>
-            <a:off x="6814526" y="1994782"/>
-            <a:ext cx="5065718" cy="144000"/>
+            <a:off x="6800878" y="2035725"/>
+            <a:ext cx="4906513" cy="144000"/>
           </a:xfrm>
           <a:prstGeom prst="rect">
             <a:avLst/>
@@ -4947,8 +5057,8 @@
         </p:nvSpPr>
         <p:spPr>
           <a:xfrm flipH="1">
-            <a:off x="7395718" y="1999170"/>
-            <a:ext cx="3480364" cy="144000"/>
+            <a:off x="7395718" y="2026466"/>
+            <a:ext cx="2412000" cy="144000"/>
           </a:xfrm>
           <a:prstGeom prst="roundRect">
             <a:avLst/>
@@ -4993,7 +5103,7 @@
         </p:nvSpPr>
         <p:spPr>
           <a:xfrm flipH="1">
-            <a:off x="8353178" y="1999104"/>
+            <a:off x="8339530" y="2026400"/>
             <a:ext cx="36000" cy="144000"/>
           </a:xfrm>
           <a:prstGeom prst="rect">
@@ -5041,7 +5151,7 @@
         </p:nvSpPr>
         <p:spPr>
           <a:xfrm>
-            <a:off x="6096652" y="87616"/>
+            <a:off x="5905812" y="72366"/>
             <a:ext cx="146556" cy="2819866"/>
           </a:xfrm>
           <a:prstGeom prst="rect">
@@ -5087,8 +5197,8 @@
         </p:nvSpPr>
         <p:spPr>
           <a:xfrm>
-            <a:off x="2622278" y="2292585"/>
-            <a:ext cx="1379272" cy="338554"/>
+            <a:off x="2418615" y="2292585"/>
+            <a:ext cx="1549470" cy="338554"/>
           </a:xfrm>
           <a:prstGeom prst="rect">
             <a:avLst/>
@@ -5132,7 +5242,7 @@
         </p:nvSpPr>
         <p:spPr>
           <a:xfrm>
-            <a:off x="6103734" y="513056"/>
+            <a:off x="5912894" y="74718"/>
             <a:ext cx="138405" cy="1201781"/>
           </a:xfrm>
           <a:prstGeom prst="roundRect">
@@ -5178,8 +5288,8 @@
         </p:nvSpPr>
         <p:spPr>
           <a:xfrm flipH="1" flipV="1">
-            <a:off x="6096652" y="1131211"/>
-            <a:ext cx="144000" cy="36000"/>
+            <a:off x="5905812" y="802057"/>
+            <a:ext cx="144000" cy="216000"/>
           </a:xfrm>
           <a:prstGeom prst="rect">
             <a:avLst/>
@@ -5226,7 +5336,7 @@
         </p:nvSpPr>
         <p:spPr>
           <a:xfrm>
-            <a:off x="4361138" y="53574"/>
+            <a:off x="4157475" y="53574"/>
             <a:ext cx="145299" cy="2846073"/>
           </a:xfrm>
           <a:prstGeom prst="rect">
@@ -5272,7 +5382,7 @@
         </p:nvSpPr>
         <p:spPr>
           <a:xfrm>
-            <a:off x="4361139" y="610994"/>
+            <a:off x="4157476" y="610994"/>
             <a:ext cx="144000" cy="1445489"/>
           </a:xfrm>
           <a:prstGeom prst="roundRect">
@@ -5318,8 +5428,8 @@
         </p:nvSpPr>
         <p:spPr>
           <a:xfrm flipH="1" flipV="1">
-            <a:off x="4361139" y="911378"/>
-            <a:ext cx="144000" cy="36000"/>
+            <a:off x="4157476" y="911378"/>
+            <a:ext cx="144000" cy="252000"/>
           </a:xfrm>
           <a:prstGeom prst="rect">
             <a:avLst/>
@@ -5366,7 +5476,7 @@
         </p:nvSpPr>
         <p:spPr>
           <a:xfrm>
-            <a:off x="6872785" y="514444"/>
+            <a:off x="6872785" y="541740"/>
             <a:ext cx="864000" cy="108000"/>
           </a:xfrm>
           <a:prstGeom prst="rect">
@@ -5402,7 +5512,7 @@
         </p:nvSpPr>
         <p:spPr>
           <a:xfrm>
-            <a:off x="7724215" y="803378"/>
+            <a:off x="7724215" y="830674"/>
             <a:ext cx="1152000" cy="108000"/>
           </a:xfrm>
           <a:prstGeom prst="rect">
@@ -5438,7 +5548,7 @@
         </p:nvSpPr>
         <p:spPr>
           <a:xfrm>
-            <a:off x="8801126" y="520097"/>
+            <a:off x="8801126" y="547393"/>
             <a:ext cx="432000" cy="108000"/>
           </a:xfrm>
           <a:prstGeom prst="rect">
@@ -5474,7 +5584,7 @@
         </p:nvSpPr>
         <p:spPr>
           <a:xfrm>
-            <a:off x="9462172" y="1184721"/>
+            <a:off x="9462172" y="1212017"/>
             <a:ext cx="864000" cy="108000"/>
           </a:xfrm>
           <a:prstGeom prst="rect">
@@ -5510,8 +5620,8 @@
         </p:nvSpPr>
         <p:spPr>
           <a:xfrm>
-            <a:off x="10326172" y="801586"/>
-            <a:ext cx="864000" cy="108000"/>
+            <a:off x="10326172" y="828882"/>
+            <a:ext cx="540000" cy="108000"/>
           </a:xfrm>
           <a:prstGeom prst="rect">
             <a:avLst/>
@@ -5546,7 +5656,7 @@
         </p:nvSpPr>
         <p:spPr>
           <a:xfrm>
-            <a:off x="8916711" y="288811"/>
+            <a:off x="8930359" y="316107"/>
             <a:ext cx="36000" cy="1720800"/>
           </a:xfrm>
           <a:prstGeom prst="rect">
@@ -5592,8 +5702,8 @@
         </p:nvSpPr>
         <p:spPr>
           <a:xfrm>
-            <a:off x="7441213" y="2439649"/>
-            <a:ext cx="864000" cy="338554"/>
+            <a:off x="6791347" y="2295810"/>
+            <a:ext cx="3277963" cy="338554"/>
           </a:xfrm>
           <a:prstGeom prst="rect">
             <a:avLst/>
@@ -5638,8 +5748,8 @@
         </p:nvCxnSpPr>
         <p:spPr>
           <a:xfrm>
-            <a:off x="4001550" y="814828"/>
-            <a:ext cx="895289" cy="1072378"/>
+            <a:off x="4014607" y="814828"/>
+            <a:ext cx="691392" cy="1057128"/>
           </a:xfrm>
           <a:prstGeom prst="curvedConnector3">
             <a:avLst/>
@@ -5665,9 +5775,175 @@
           </a:fontRef>
         </p:style>
       </p:cxnSp>
+      <p:sp>
+        <p:nvSpPr>
+          <p:cNvPr id="105" name="文本框 104"/>
+          <p:cNvSpPr txBox="1"/>
+          <p:nvPr/>
+        </p:nvSpPr>
+        <p:spPr>
+          <a:xfrm>
+            <a:off x="4641310" y="3031521"/>
+            <a:ext cx="697367" cy="338554"/>
+          </a:xfrm>
+          <a:prstGeom prst="rect">
+            <a:avLst/>
+          </a:prstGeom>
+          <a:solidFill>
+            <a:schemeClr val="bg1">
+              <a:lumMod val="95000"/>
+            </a:schemeClr>
+          </a:solidFill>
+          <a:ln w="12700">
+            <a:solidFill>
+              <a:schemeClr val="tx1"/>
+            </a:solidFill>
+          </a:ln>
+        </p:spPr>
+        <p:txBody>
+          <a:bodyPr wrap="square" rtlCol="0">
+            <a:spAutoFit/>
+          </a:bodyPr>
+          <a:lstStyle/>
+          <a:p>
+            <a:pPr algn="r"/>
+            <a:r>
+              <a:rPr lang="en-US" altLang="zh-CN" sz="1600" b="1" dirty="0">
+                <a:latin typeface="等线" panose="02010600030101010101" pitchFamily="2" charset="-122"/>
+                <a:ea typeface="等线" panose="02010600030101010101" pitchFamily="2" charset="-122"/>
+              </a:rPr>
+              <a:t>2</a:t>
+            </a:r>
+            <a:r>
+              <a:rPr lang="en-US" altLang="zh-CN" sz="1600" b="1" dirty="0" smtClean="0">
+                <a:latin typeface="等线" panose="02010600030101010101" pitchFamily="2" charset="-122"/>
+                <a:ea typeface="等线" panose="02010600030101010101" pitchFamily="2" charset="-122"/>
+              </a:rPr>
+              <a:t>00</a:t>
+            </a:r>
+            <a:endParaRPr lang="zh-CN" altLang="en-US" sz="1600" b="1" dirty="0">
+              <a:latin typeface="等线" panose="02010600030101010101" pitchFamily="2" charset="-122"/>
+              <a:ea typeface="等线" panose="02010600030101010101" pitchFamily="2" charset="-122"/>
+            </a:endParaRPr>
+          </a:p>
+        </p:txBody>
+      </p:sp>
+      <p:sp>
+        <p:nvSpPr>
+          <p:cNvPr id="106" name="文本框 105"/>
+          <p:cNvSpPr txBox="1"/>
+          <p:nvPr/>
+        </p:nvSpPr>
+        <p:spPr>
+          <a:xfrm>
+            <a:off x="5338677" y="3035613"/>
+            <a:ext cx="697367" cy="338554"/>
+          </a:xfrm>
+          <a:prstGeom prst="rect">
+            <a:avLst/>
+          </a:prstGeom>
+          <a:solidFill>
+            <a:schemeClr val="bg1">
+              <a:lumMod val="95000"/>
+            </a:schemeClr>
+          </a:solidFill>
+          <a:ln w="12700">
+            <a:solidFill>
+              <a:schemeClr val="tx1"/>
+            </a:solidFill>
+          </a:ln>
+        </p:spPr>
+        <p:txBody>
+          <a:bodyPr wrap="square" rtlCol="0">
+            <a:spAutoFit/>
+          </a:bodyPr>
+          <a:lstStyle/>
+          <a:p>
+            <a:pPr algn="r"/>
+            <a:r>
+              <a:rPr lang="en-US" altLang="zh-CN" sz="1600" b="1" dirty="0" smtClean="0">
+                <a:latin typeface="等线" panose="02010600030101010101" pitchFamily="2" charset="-122"/>
+                <a:ea typeface="等线" panose="02010600030101010101" pitchFamily="2" charset="-122"/>
+              </a:rPr>
+              <a:t>1200</a:t>
+            </a:r>
+            <a:endParaRPr lang="zh-CN" altLang="en-US" sz="1600" b="1" dirty="0">
+              <a:latin typeface="等线" panose="02010600030101010101" pitchFamily="2" charset="-122"/>
+              <a:ea typeface="等线" panose="02010600030101010101" pitchFamily="2" charset="-122"/>
+            </a:endParaRPr>
+          </a:p>
+        </p:txBody>
+      </p:sp>
+      <p:sp>
+        <p:nvSpPr>
+          <p:cNvPr id="107" name="文本框 106"/>
+          <p:cNvSpPr txBox="1"/>
+          <p:nvPr/>
+        </p:nvSpPr>
+        <p:spPr>
+          <a:xfrm>
+            <a:off x="10717310" y="11616"/>
+            <a:ext cx="216000" cy="216000"/>
+          </a:xfrm>
+          <a:prstGeom prst="rect">
+            <a:avLst/>
+          </a:prstGeom>
+          <a:solidFill>
+            <a:srgbClr val="E9DDBD"/>
+          </a:solidFill>
+          <a:ln w="12700">
+            <a:solidFill>
+              <a:schemeClr val="tx1"/>
+            </a:solidFill>
+          </a:ln>
+        </p:spPr>
+        <p:txBody>
+          <a:bodyPr wrap="square" rtlCol="0">
+            <a:spAutoFit/>
+          </a:bodyPr>
+          <a:lstStyle/>
+          <a:p>
+            <a:endParaRPr lang="zh-CN" altLang="en-US" sz="1600" b="1" dirty="0">
+              <a:latin typeface="等线" panose="02010600030101010101" pitchFamily="2" charset="-122"/>
+              <a:ea typeface="等线" panose="02010600030101010101" pitchFamily="2" charset="-122"/>
+            </a:endParaRPr>
+          </a:p>
+        </p:txBody>
+      </p:sp>
+      <p:sp>
+        <p:nvSpPr>
+          <p:cNvPr id="108" name="文本框 107"/>
+          <p:cNvSpPr txBox="1"/>
+          <p:nvPr/>
+        </p:nvSpPr>
+        <p:spPr>
+          <a:xfrm>
+            <a:off x="11405181" y="-50686"/>
+            <a:ext cx="506087" cy="338554"/>
+          </a:xfrm>
+          <a:prstGeom prst="rect">
+            <a:avLst/>
+          </a:prstGeom>
+          <a:noFill/>
+        </p:spPr>
+        <p:txBody>
+          <a:bodyPr wrap="square" rtlCol="0">
+            <a:spAutoFit/>
+          </a:bodyPr>
+          <a:lstStyle/>
+          <a:p>
+            <a:pPr algn="r"/>
+            <a:r>
+              <a:rPr lang="en-US" altLang="zh-CN" sz="1600" b="1" dirty="0" smtClean="0"/>
+              <a:t>30</a:t>
+            </a:r>
+            <a:endParaRPr lang="zh-CN" altLang="en-US" sz="1600" b="1" dirty="0"/>
+          </a:p>
+        </p:txBody>
+      </p:sp>
       <p:cxnSp>
         <p:nvCxnSpPr>
-          <p:cNvPr id="100" name="曲线连接符 99"/>
+          <p:cNvPr id="69" name="曲线连接符 68"/>
           <p:cNvCxnSpPr>
             <a:stCxn id="45" idx="3"/>
             <a:endCxn id="99" idx="1"/>
@@ -5676,8 +5952,8 @@
         </p:nvCxnSpPr>
         <p:spPr>
           <a:xfrm>
-            <a:off x="5760839" y="1887206"/>
-            <a:ext cx="1680374" cy="721720"/>
+            <a:off x="5810753" y="1871956"/>
+            <a:ext cx="980594" cy="593131"/>
           </a:xfrm>
           <a:prstGeom prst="curvedConnector3">
             <a:avLst/>
@@ -5705,23 +5981,20 @@
       </p:cxnSp>
       <p:sp>
         <p:nvSpPr>
-          <p:cNvPr id="103" name="文本框 102"/>
+          <p:cNvPr id="75" name="文本框 74"/>
           <p:cNvSpPr txBox="1"/>
           <p:nvPr/>
         </p:nvSpPr>
         <p:spPr>
           <a:xfrm>
-            <a:off x="8444215" y="2438103"/>
-            <a:ext cx="720000" cy="338554"/>
-          </a:xfrm>
-          <a:prstGeom prst="rect">
-            <a:avLst/>
-          </a:prstGeom>
-          <a:solidFill>
-            <a:schemeClr val="accent4">
-              <a:lumMod val="20000"/>
-              <a:lumOff val="80000"/>
-            </a:schemeClr>
+            <a:off x="10866172" y="1525807"/>
+            <a:ext cx="864000" cy="108000"/>
+          </a:xfrm>
+          <a:prstGeom prst="rect">
+            <a:avLst/>
+          </a:prstGeom>
+          <a:solidFill>
+            <a:srgbClr val="E9DDBD"/>
           </a:solidFill>
           <a:ln w="12700">
             <a:solidFill>
@@ -5735,12 +6008,414 @@
           </a:bodyPr>
           <a:lstStyle/>
           <a:p>
+            <a:endParaRPr lang="zh-CN" altLang="en-US" sz="1600" b="1" dirty="0">
+              <a:latin typeface="等线" panose="02010600030101010101" pitchFamily="2" charset="-122"/>
+              <a:ea typeface="等线" panose="02010600030101010101" pitchFamily="2" charset="-122"/>
+            </a:endParaRPr>
+          </a:p>
+        </p:txBody>
+      </p:sp>
+      <p:sp>
+        <p:nvSpPr>
+          <p:cNvPr id="78" name="文本框 77"/>
+          <p:cNvSpPr txBox="1"/>
+          <p:nvPr/>
+        </p:nvSpPr>
+        <p:spPr>
+          <a:xfrm>
+            <a:off x="921658" y="557424"/>
+            <a:ext cx="864000" cy="369332"/>
+          </a:xfrm>
+          <a:prstGeom prst="rect">
+            <a:avLst/>
+          </a:prstGeom>
+          <a:solidFill>
+            <a:srgbClr val="AFABAB"/>
+          </a:solidFill>
+          <a:ln w="25400">
+            <a:solidFill>
+              <a:schemeClr val="tx1"/>
+            </a:solidFill>
+          </a:ln>
+        </p:spPr>
+        <p:txBody>
+          <a:bodyPr wrap="square" rtlCol="0">
+            <a:spAutoFit/>
+          </a:bodyPr>
+          <a:lstStyle>
+            <a:defPPr>
+              <a:defRPr lang="zh-CN"/>
+            </a:defPPr>
+            <a:lvl1pPr algn="ctr">
+              <a:defRPr sz="2000" b="1">
+                <a:latin typeface="等线" panose="02010600030101010101" pitchFamily="2" charset="-122"/>
+                <a:ea typeface="等线" panose="02010600030101010101" pitchFamily="2" charset="-122"/>
+              </a:defRPr>
+            </a:lvl1pPr>
+          </a:lstStyle>
+          <a:p>
+            <a:r>
+              <a:rPr lang="en-US" altLang="zh-CN" sz="1800" dirty="0" smtClean="0"/>
+              <a:t>SPWN</a:t>
+            </a:r>
+            <a:endParaRPr lang="zh-CN" altLang="en-US" sz="1800" dirty="0"/>
+          </a:p>
+        </p:txBody>
+      </p:sp>
+      <p:sp>
+        <p:nvSpPr>
+          <p:cNvPr id="102" name="矩形 101"/>
+          <p:cNvSpPr/>
+          <p:nvPr/>
+        </p:nvSpPr>
+        <p:spPr>
+          <a:xfrm>
+            <a:off x="11721039" y="316107"/>
+            <a:ext cx="146556" cy="1705971"/>
+          </a:xfrm>
+          <a:prstGeom prst="rect">
+            <a:avLst/>
+          </a:prstGeom>
+          <a:solidFill>
+            <a:srgbClr val="57564D"/>
+          </a:solidFill>
+          <a:ln>
+            <a:noFill/>
+          </a:ln>
+        </p:spPr>
+        <p:style>
+          <a:lnRef idx="2">
+            <a:schemeClr val="accent1">
+              <a:shade val="50000"/>
+            </a:schemeClr>
+          </a:lnRef>
+          <a:fillRef idx="1">
+            <a:schemeClr val="accent1"/>
+          </a:fillRef>
+          <a:effectRef idx="0">
+            <a:schemeClr val="accent1"/>
+          </a:effectRef>
+          <a:fontRef idx="minor">
+            <a:schemeClr val="lt1"/>
+          </a:fontRef>
+        </p:style>
+        <p:txBody>
+          <a:bodyPr rtlCol="0" anchor="ctr"/>
+          <a:lstStyle/>
+          <a:p>
+            <a:pPr algn="ctr"/>
+            <a:endParaRPr lang="zh-CN" altLang="en-US"/>
+          </a:p>
+        </p:txBody>
+      </p:sp>
+      <p:sp>
+        <p:nvSpPr>
+          <p:cNvPr id="109" name="圆角矩形 108"/>
+          <p:cNvSpPr/>
+          <p:nvPr/>
+        </p:nvSpPr>
+        <p:spPr>
+          <a:xfrm>
+            <a:off x="11728121" y="318459"/>
+            <a:ext cx="138405" cy="1201781"/>
+          </a:xfrm>
+          <a:prstGeom prst="roundRect">
+            <a:avLst/>
+          </a:prstGeom>
+          <a:solidFill>
+            <a:schemeClr val="bg1">
+              <a:lumMod val="85000"/>
+            </a:schemeClr>
+          </a:solidFill>
+          <a:ln w="12700"/>
+        </p:spPr>
+        <p:style>
+          <a:lnRef idx="2">
+            <a:schemeClr val="accent1">
+              <a:shade val="50000"/>
+            </a:schemeClr>
+          </a:lnRef>
+          <a:fillRef idx="1">
+            <a:schemeClr val="accent1"/>
+          </a:fillRef>
+          <a:effectRef idx="0">
+            <a:schemeClr val="accent1"/>
+          </a:effectRef>
+          <a:fontRef idx="minor">
+            <a:schemeClr val="lt1"/>
+          </a:fontRef>
+        </p:style>
+        <p:txBody>
+          <a:bodyPr rtlCol="0" anchor="ctr"/>
+          <a:lstStyle/>
+          <a:p>
+            <a:pPr algn="ctr"/>
+            <a:endParaRPr lang="zh-CN" altLang="en-US"/>
+          </a:p>
+        </p:txBody>
+      </p:sp>
+      <p:sp>
+        <p:nvSpPr>
+          <p:cNvPr id="110" name="矩形 109"/>
+          <p:cNvSpPr/>
+          <p:nvPr/>
+        </p:nvSpPr>
+        <p:spPr>
+          <a:xfrm flipH="1" flipV="1">
+            <a:off x="11721039" y="377058"/>
+            <a:ext cx="144000" cy="144000"/>
+          </a:xfrm>
+          <a:prstGeom prst="rect">
+            <a:avLst/>
+          </a:prstGeom>
+          <a:solidFill>
+            <a:srgbClr val="66FF66"/>
+          </a:solidFill>
+          <a:ln>
+            <a:solidFill>
+              <a:schemeClr val="tx1"/>
+            </a:solidFill>
+          </a:ln>
+        </p:spPr>
+        <p:style>
+          <a:lnRef idx="2">
+            <a:schemeClr val="accent1">
+              <a:shade val="50000"/>
+            </a:schemeClr>
+          </a:lnRef>
+          <a:fillRef idx="1">
+            <a:schemeClr val="accent1"/>
+          </a:fillRef>
+          <a:effectRef idx="0">
+            <a:schemeClr val="accent1"/>
+          </a:effectRef>
+          <a:fontRef idx="minor">
+            <a:schemeClr val="lt1"/>
+          </a:fontRef>
+        </p:style>
+        <p:txBody>
+          <a:bodyPr rtlCol="0" anchor="ctr"/>
+          <a:lstStyle/>
+          <a:p>
+            <a:pPr algn="ctr"/>
+            <a:endParaRPr lang="zh-CN" altLang="en-US"/>
+          </a:p>
+        </p:txBody>
+      </p:sp>
+      <p:sp>
+        <p:nvSpPr>
+          <p:cNvPr id="112" name="文本框 111"/>
+          <p:cNvSpPr txBox="1"/>
+          <p:nvPr/>
+        </p:nvSpPr>
+        <p:spPr>
+          <a:xfrm>
+            <a:off x="2495991" y="4390994"/>
+            <a:ext cx="864000" cy="216000"/>
+          </a:xfrm>
+          <a:prstGeom prst="rect">
+            <a:avLst/>
+          </a:prstGeom>
+          <a:solidFill>
+            <a:schemeClr val="tx1"/>
+          </a:solidFill>
+          <a:ln w="12700">
+            <a:noFill/>
+          </a:ln>
+        </p:spPr>
+        <p:txBody>
+          <a:bodyPr wrap="square" rtlCol="0">
+            <a:spAutoFit/>
+          </a:bodyPr>
+          <a:lstStyle/>
+          <a:p>
+            <a:endParaRPr lang="zh-CN" altLang="en-US" sz="1600" b="1" dirty="0">
+              <a:latin typeface="等线" panose="02010600030101010101" pitchFamily="2" charset="-122"/>
+              <a:ea typeface="等线" panose="02010600030101010101" pitchFamily="2" charset="-122"/>
+            </a:endParaRPr>
+          </a:p>
+        </p:txBody>
+      </p:sp>
+      <p:sp>
+        <p:nvSpPr>
+          <p:cNvPr id="113" name="文本框 112"/>
+          <p:cNvSpPr txBox="1"/>
+          <p:nvPr/>
+        </p:nvSpPr>
+        <p:spPr>
+          <a:xfrm>
+            <a:off x="2437913" y="4332698"/>
+            <a:ext cx="701797" cy="338554"/>
+          </a:xfrm>
+          <a:prstGeom prst="rect">
+            <a:avLst/>
+          </a:prstGeom>
+          <a:noFill/>
+          <a:ln>
+            <a:noFill/>
+          </a:ln>
+        </p:spPr>
+        <p:txBody>
+          <a:bodyPr wrap="square" rtlCol="0">
+            <a:spAutoFit/>
+          </a:bodyPr>
+          <a:lstStyle/>
+          <a:p>
+            <a:r>
+              <a:rPr lang="en-US" altLang="zh-CN" sz="1600" b="1" dirty="0" smtClean="0">
+                <a:solidFill>
+                  <a:srgbClr val="66FF66"/>
+                </a:solidFill>
+              </a:rPr>
+              <a:t>1210</a:t>
+            </a:r>
+            <a:endParaRPr lang="zh-CN" altLang="en-US" sz="1600" b="1" dirty="0">
+              <a:solidFill>
+                <a:srgbClr val="66FF66"/>
+              </a:solidFill>
+            </a:endParaRPr>
+          </a:p>
+        </p:txBody>
+      </p:sp>
+      <p:sp>
+        <p:nvSpPr>
+          <p:cNvPr id="120" name="文本框 119"/>
+          <p:cNvSpPr txBox="1"/>
+          <p:nvPr/>
+        </p:nvSpPr>
+        <p:spPr>
+          <a:xfrm>
+            <a:off x="10069310" y="4404216"/>
+            <a:ext cx="864000" cy="216000"/>
+          </a:xfrm>
+          <a:prstGeom prst="rect">
+            <a:avLst/>
+          </a:prstGeom>
+          <a:solidFill>
+            <a:schemeClr val="bg1"/>
+          </a:solidFill>
+          <a:ln w="12700">
+            <a:noFill/>
+          </a:ln>
+        </p:spPr>
+        <p:txBody>
+          <a:bodyPr wrap="square" rtlCol="0">
+            <a:spAutoFit/>
+          </a:bodyPr>
+          <a:lstStyle/>
+          <a:p>
+            <a:endParaRPr lang="zh-CN" altLang="en-US" sz="1600" b="1" dirty="0">
+              <a:latin typeface="等线" panose="02010600030101010101" pitchFamily="2" charset="-122"/>
+              <a:ea typeface="等线" panose="02010600030101010101" pitchFamily="2" charset="-122"/>
+            </a:endParaRPr>
+          </a:p>
+        </p:txBody>
+      </p:sp>
+      <p:sp>
+        <p:nvSpPr>
+          <p:cNvPr id="121" name="文本框 120"/>
+          <p:cNvSpPr txBox="1"/>
+          <p:nvPr/>
+        </p:nvSpPr>
+        <p:spPr>
+          <a:xfrm>
+            <a:off x="9253310" y="4393127"/>
+            <a:ext cx="720000" cy="216000"/>
+          </a:xfrm>
+          <a:prstGeom prst="rect">
+            <a:avLst/>
+          </a:prstGeom>
+          <a:solidFill>
+            <a:srgbClr val="E9DDBD"/>
+          </a:solidFill>
+          <a:ln w="12700">
+            <a:solidFill>
+              <a:schemeClr val="tx1"/>
+            </a:solidFill>
+          </a:ln>
+        </p:spPr>
+        <p:txBody>
+          <a:bodyPr wrap="square" rtlCol="0">
+            <a:spAutoFit/>
+          </a:bodyPr>
+          <a:lstStyle/>
+          <a:p>
+            <a:endParaRPr lang="zh-CN" altLang="en-US" sz="1600" b="1" dirty="0">
+              <a:latin typeface="等线" panose="02010600030101010101" pitchFamily="2" charset="-122"/>
+              <a:ea typeface="等线" panose="02010600030101010101" pitchFamily="2" charset="-122"/>
+            </a:endParaRPr>
+          </a:p>
+        </p:txBody>
+      </p:sp>
+      <p:sp>
+        <p:nvSpPr>
+          <p:cNvPr id="122" name="文本框 121"/>
+          <p:cNvSpPr txBox="1"/>
+          <p:nvPr/>
+        </p:nvSpPr>
+        <p:spPr>
+          <a:xfrm>
+            <a:off x="10473452" y="4330825"/>
+            <a:ext cx="506087" cy="338554"/>
+          </a:xfrm>
+          <a:prstGeom prst="rect">
+            <a:avLst/>
+          </a:prstGeom>
+          <a:noFill/>
+        </p:spPr>
+        <p:txBody>
+          <a:bodyPr wrap="square" rtlCol="0">
+            <a:spAutoFit/>
+          </a:bodyPr>
+          <a:lstStyle/>
+          <a:p>
+            <a:pPr algn="r"/>
+            <a:r>
+              <a:rPr lang="en-US" altLang="zh-CN" sz="1600" b="1" dirty="0" smtClean="0"/>
+              <a:t>300</a:t>
+            </a:r>
+            <a:endParaRPr lang="zh-CN" altLang="en-US" sz="1600" b="1" dirty="0"/>
+          </a:p>
+        </p:txBody>
+      </p:sp>
+      <p:sp>
+        <p:nvSpPr>
+          <p:cNvPr id="125" name="文本框 124"/>
+          <p:cNvSpPr txBox="1"/>
+          <p:nvPr/>
+        </p:nvSpPr>
+        <p:spPr>
+          <a:xfrm>
+            <a:off x="2885726" y="3079194"/>
+            <a:ext cx="697367" cy="338554"/>
+          </a:xfrm>
+          <a:prstGeom prst="rect">
+            <a:avLst/>
+          </a:prstGeom>
+          <a:solidFill>
+            <a:schemeClr val="bg1">
+              <a:lumMod val="95000"/>
+            </a:schemeClr>
+          </a:solidFill>
+          <a:ln w="12700">
+            <a:solidFill>
+              <a:schemeClr val="tx1"/>
+            </a:solidFill>
+          </a:ln>
+        </p:spPr>
+        <p:txBody>
+          <a:bodyPr wrap="square" rtlCol="0">
+            <a:spAutoFit/>
+          </a:bodyPr>
+          <a:lstStyle/>
+          <a:p>
+            <a:pPr algn="r"/>
             <a:r>
               <a:rPr lang="en-US" altLang="zh-CN" sz="1600" b="1" dirty="0" smtClean="0">
                 <a:latin typeface="等线" panose="02010600030101010101" pitchFamily="2" charset="-122"/>
                 <a:ea typeface="等线" panose="02010600030101010101" pitchFamily="2" charset="-122"/>
               </a:rPr>
-              <a:t>start</a:t>
+              <a:t>600</a:t>
             </a:r>
             <a:endParaRPr lang="zh-CN" altLang="en-US" sz="1600" b="1" dirty="0">
               <a:latin typeface="等线" panose="02010600030101010101" pitchFamily="2" charset="-122"/>
@@ -5751,20 +6426,22 @@
       </p:sp>
       <p:sp>
         <p:nvSpPr>
-          <p:cNvPr id="104" name="文本框 103"/>
+          <p:cNvPr id="126" name="文本框 125"/>
           <p:cNvSpPr txBox="1"/>
           <p:nvPr/>
         </p:nvSpPr>
         <p:spPr>
           <a:xfrm>
-            <a:off x="10014103" y="2436333"/>
-            <a:ext cx="720000" cy="338554"/>
-          </a:xfrm>
-          <a:prstGeom prst="rect">
-            <a:avLst/>
-          </a:prstGeom>
-          <a:solidFill>
-            <a:srgbClr val="E9DDBD"/>
+            <a:off x="3596172" y="3069270"/>
+            <a:ext cx="697367" cy="338554"/>
+          </a:xfrm>
+          <a:prstGeom prst="rect">
+            <a:avLst/>
+          </a:prstGeom>
+          <a:solidFill>
+            <a:schemeClr val="bg1">
+              <a:lumMod val="95000"/>
+            </a:schemeClr>
           </a:solidFill>
           <a:ln w="12700">
             <a:solidFill>
@@ -5778,12 +6455,20 @@
           </a:bodyPr>
           <a:lstStyle/>
           <a:p>
+            <a:pPr algn="r"/>
             <a:r>
               <a:rPr lang="en-US" altLang="zh-CN" sz="1600" b="1" dirty="0" smtClean="0">
                 <a:latin typeface="等线" panose="02010600030101010101" pitchFamily="2" charset="-122"/>
                 <a:ea typeface="等线" panose="02010600030101010101" pitchFamily="2" charset="-122"/>
               </a:rPr>
-              <a:t>end</a:t>
+              <a:t>200</a:t>
+            </a:r>
+            <a:r>
+              <a:rPr lang="en-US" altLang="zh-CN" sz="1600" b="1" dirty="0" smtClean="0">
+                <a:latin typeface="等线" panose="02010600030101010101" pitchFamily="2" charset="-122"/>
+                <a:ea typeface="等线" panose="02010600030101010101" pitchFamily="2" charset="-122"/>
+              </a:rPr>
+              <a:t>0</a:t>
             </a:r>
             <a:endParaRPr lang="zh-CN" altLang="en-US" sz="1600" b="1" dirty="0">
               <a:latin typeface="等线" panose="02010600030101010101" pitchFamily="2" charset="-122"/>
@@ -5794,13 +6479,13 @@
       </p:sp>
       <p:sp>
         <p:nvSpPr>
-          <p:cNvPr id="105" name="文本框 104"/>
+          <p:cNvPr id="127" name="文本框 126"/>
           <p:cNvSpPr txBox="1"/>
           <p:nvPr/>
         </p:nvSpPr>
         <p:spPr>
           <a:xfrm>
-            <a:off x="9154534" y="2436333"/>
+            <a:off x="6782937" y="2798034"/>
             <a:ext cx="697367" cy="338554"/>
           </a:xfrm>
           <a:prstGeom prst="rect">
@@ -5823,6 +6508,7 @@
           </a:bodyPr>
           <a:lstStyle/>
           <a:p>
+            <a:pPr algn="r"/>
             <a:r>
               <a:rPr lang="en-US" altLang="zh-CN" sz="1600" b="1" dirty="0" smtClean="0">
                 <a:latin typeface="等线" panose="02010600030101010101" pitchFamily="2" charset="-122"/>
@@ -5839,13 +6525,13 @@
       </p:sp>
       <p:sp>
         <p:nvSpPr>
-          <p:cNvPr id="106" name="文本框 105"/>
+          <p:cNvPr id="128" name="文本框 127"/>
           <p:cNvSpPr txBox="1"/>
           <p:nvPr/>
         </p:nvSpPr>
         <p:spPr>
           <a:xfrm>
-            <a:off x="10734103" y="2438081"/>
+            <a:off x="7480304" y="2802126"/>
             <a:ext cx="697367" cy="338554"/>
           </a:xfrm>
           <a:prstGeom prst="rect">
@@ -5868,6 +6554,7 @@
           </a:bodyPr>
           <a:lstStyle/>
           <a:p>
+            <a:pPr algn="r"/>
             <a:r>
               <a:rPr lang="en-US" altLang="zh-CN" sz="1600" b="1" dirty="0" smtClean="0">
                 <a:latin typeface="等线" panose="02010600030101010101" pitchFamily="2" charset="-122"/>
@@ -5884,24 +6571,24 @@
       </p:sp>
       <p:sp>
         <p:nvSpPr>
-          <p:cNvPr id="107" name="文本框 106"/>
+          <p:cNvPr id="129" name="文本框 128"/>
           <p:cNvSpPr txBox="1"/>
           <p:nvPr/>
         </p:nvSpPr>
         <p:spPr>
           <a:xfrm>
-            <a:off x="7123944" y="90424"/>
-            <a:ext cx="216000" cy="108000"/>
-          </a:xfrm>
-          <a:prstGeom prst="rect">
-            <a:avLst/>
-          </a:prstGeom>
-          <a:solidFill>
-            <a:srgbClr val="E9DDBD"/>
-          </a:solidFill>
-          <a:ln w="12700">
+            <a:off x="8492564" y="2767560"/>
+            <a:ext cx="864000" cy="374571"/>
+          </a:xfrm>
+          <a:prstGeom prst="roundRect">
+            <a:avLst/>
+          </a:prstGeom>
+          <a:solidFill>
+            <a:srgbClr val="FFF909"/>
+          </a:solidFill>
+          <a:ln w="25400">
             <a:solidFill>
-              <a:schemeClr val="tx1"/>
+              <a:schemeClr val="bg1"/>
             </a:solidFill>
           </a:ln>
         </p:spPr>
@@ -5911,6 +6598,13 @@
           </a:bodyPr>
           <a:lstStyle/>
           <a:p>
+            <a:r>
+              <a:rPr lang="en-US" altLang="zh-CN" sz="1600" b="1" dirty="0">
+                <a:latin typeface="等线" panose="02010600030101010101" pitchFamily="2" charset="-122"/>
+                <a:ea typeface="等线" panose="02010600030101010101" pitchFamily="2" charset="-122"/>
+              </a:rPr>
+              <a:t>new</a:t>
+            </a:r>
             <a:endParaRPr lang="zh-CN" altLang="en-US" sz="1600" b="1" dirty="0">
               <a:latin typeface="等线" panose="02010600030101010101" pitchFamily="2" charset="-122"/>
               <a:ea typeface="等线" panose="02010600030101010101" pitchFamily="2" charset="-122"/>
@@ -5920,19 +6614,26 @@
       </p:sp>
       <p:sp>
         <p:nvSpPr>
-          <p:cNvPr id="108" name="文本框 107"/>
+          <p:cNvPr id="135" name="文本框 134"/>
           <p:cNvSpPr txBox="1"/>
           <p:nvPr/>
         </p:nvSpPr>
         <p:spPr>
           <a:xfrm>
-            <a:off x="6730854" y="-15334"/>
-            <a:ext cx="506087" cy="338554"/>
-          </a:xfrm>
-          <a:prstGeom prst="rect">
-            <a:avLst/>
-          </a:prstGeom>
-          <a:noFill/>
+            <a:off x="4716390" y="4358073"/>
+            <a:ext cx="360000" cy="216000"/>
+          </a:xfrm>
+          <a:prstGeom prst="rect">
+            <a:avLst/>
+          </a:prstGeom>
+          <a:solidFill>
+            <a:srgbClr val="FFD966"/>
+          </a:solidFill>
+          <a:ln w="25400">
+            <a:solidFill>
+              <a:schemeClr val="tx1"/>
+            </a:solidFill>
+          </a:ln>
         </p:spPr>
         <p:txBody>
           <a:bodyPr wrap="square" rtlCol="0">
@@ -5940,11 +6641,357 @@
           </a:bodyPr>
           <a:lstStyle/>
           <a:p>
-            <a:r>
-              <a:rPr lang="en-US" altLang="zh-CN" sz="1600" b="1" dirty="0" smtClean="0"/>
-              <a:t>30</a:t>
-            </a:r>
-            <a:endParaRPr lang="zh-CN" altLang="en-US" sz="1600" b="1" dirty="0"/>
+            <a:endParaRPr lang="zh-CN" altLang="en-US" sz="2000" b="1" dirty="0">
+              <a:latin typeface="等线" panose="02010600030101010101" pitchFamily="2" charset="-122"/>
+              <a:ea typeface="等线" panose="02010600030101010101" pitchFamily="2" charset="-122"/>
+            </a:endParaRPr>
+          </a:p>
+        </p:txBody>
+      </p:sp>
+      <p:sp>
+        <p:nvSpPr>
+          <p:cNvPr id="137" name="文本框 136"/>
+          <p:cNvSpPr txBox="1"/>
+          <p:nvPr/>
+        </p:nvSpPr>
+        <p:spPr>
+          <a:xfrm>
+            <a:off x="5073146" y="4358073"/>
+            <a:ext cx="360000" cy="216000"/>
+          </a:xfrm>
+          <a:prstGeom prst="rect">
+            <a:avLst/>
+          </a:prstGeom>
+          <a:solidFill>
+            <a:srgbClr val="ED6D6B"/>
+          </a:solidFill>
+          <a:ln w="25400">
+            <a:solidFill>
+              <a:schemeClr val="tx1"/>
+            </a:solidFill>
+          </a:ln>
+        </p:spPr>
+        <p:txBody>
+          <a:bodyPr wrap="square" rtlCol="0">
+            <a:spAutoFit/>
+          </a:bodyPr>
+          <a:lstStyle/>
+          <a:p>
+            <a:endParaRPr lang="zh-CN" altLang="en-US" sz="2000" b="1" dirty="0">
+              <a:latin typeface="等线" panose="02010600030101010101" pitchFamily="2" charset="-122"/>
+              <a:ea typeface="等线" panose="02010600030101010101" pitchFamily="2" charset="-122"/>
+            </a:endParaRPr>
+          </a:p>
+        </p:txBody>
+      </p:sp>
+      <p:sp>
+        <p:nvSpPr>
+          <p:cNvPr id="138" name="文本框 137"/>
+          <p:cNvSpPr txBox="1"/>
+          <p:nvPr/>
+        </p:nvSpPr>
+        <p:spPr>
+          <a:xfrm>
+            <a:off x="5429907" y="4358073"/>
+            <a:ext cx="360000" cy="216000"/>
+          </a:xfrm>
+          <a:prstGeom prst="rect">
+            <a:avLst/>
+          </a:prstGeom>
+          <a:solidFill>
+            <a:srgbClr val="4B79FB"/>
+          </a:solidFill>
+          <a:ln w="25400">
+            <a:solidFill>
+              <a:schemeClr val="tx1"/>
+            </a:solidFill>
+          </a:ln>
+        </p:spPr>
+        <p:txBody>
+          <a:bodyPr wrap="square" rtlCol="0">
+            <a:spAutoFit/>
+          </a:bodyPr>
+          <a:lstStyle/>
+          <a:p>
+            <a:endParaRPr lang="zh-CN" altLang="en-US" sz="2000" b="1" dirty="0">
+              <a:latin typeface="等线" panose="02010600030101010101" pitchFamily="2" charset="-122"/>
+              <a:ea typeface="等线" panose="02010600030101010101" pitchFamily="2" charset="-122"/>
+            </a:endParaRPr>
+          </a:p>
+        </p:txBody>
+      </p:sp>
+      <p:sp>
+        <p:nvSpPr>
+          <p:cNvPr id="139" name="文本框 138"/>
+          <p:cNvSpPr txBox="1"/>
+          <p:nvPr/>
+        </p:nvSpPr>
+        <p:spPr>
+          <a:xfrm>
+            <a:off x="5794268" y="4358073"/>
+            <a:ext cx="360000" cy="216000"/>
+          </a:xfrm>
+          <a:prstGeom prst="rect">
+            <a:avLst/>
+          </a:prstGeom>
+          <a:solidFill>
+            <a:srgbClr val="50D0C4"/>
+          </a:solidFill>
+          <a:ln w="25400">
+            <a:solidFill>
+              <a:schemeClr val="tx1"/>
+            </a:solidFill>
+          </a:ln>
+        </p:spPr>
+        <p:txBody>
+          <a:bodyPr wrap="square" rtlCol="0">
+            <a:spAutoFit/>
+          </a:bodyPr>
+          <a:lstStyle/>
+          <a:p>
+            <a:endParaRPr lang="zh-CN" altLang="en-US" sz="2000" b="1" dirty="0">
+              <a:latin typeface="等线" panose="02010600030101010101" pitchFamily="2" charset="-122"/>
+              <a:ea typeface="等线" panose="02010600030101010101" pitchFamily="2" charset="-122"/>
+            </a:endParaRPr>
+          </a:p>
+        </p:txBody>
+      </p:sp>
+      <p:sp>
+        <p:nvSpPr>
+          <p:cNvPr id="140" name="文本框 139"/>
+          <p:cNvSpPr txBox="1"/>
+          <p:nvPr/>
+        </p:nvSpPr>
+        <p:spPr>
+          <a:xfrm>
+            <a:off x="6149392" y="4356565"/>
+            <a:ext cx="360000" cy="216000"/>
+          </a:xfrm>
+          <a:prstGeom prst="rect">
+            <a:avLst/>
+          </a:prstGeom>
+          <a:solidFill>
+            <a:srgbClr val="BB71C1"/>
+          </a:solidFill>
+          <a:ln w="25400">
+            <a:solidFill>
+              <a:schemeClr val="tx1"/>
+            </a:solidFill>
+          </a:ln>
+        </p:spPr>
+        <p:txBody>
+          <a:bodyPr wrap="square" rtlCol="0">
+            <a:spAutoFit/>
+          </a:bodyPr>
+          <a:lstStyle/>
+          <a:p>
+            <a:endParaRPr lang="zh-CN" altLang="en-US" sz="2000" b="1" dirty="0">
+              <a:latin typeface="等线" panose="02010600030101010101" pitchFamily="2" charset="-122"/>
+              <a:ea typeface="等线" panose="02010600030101010101" pitchFamily="2" charset="-122"/>
+            </a:endParaRPr>
+          </a:p>
+        </p:txBody>
+      </p:sp>
+      <p:sp>
+        <p:nvSpPr>
+          <p:cNvPr id="141" name="文本框 140"/>
+          <p:cNvSpPr txBox="1"/>
+          <p:nvPr/>
+        </p:nvSpPr>
+        <p:spPr>
+          <a:xfrm>
+            <a:off x="6736536" y="4355528"/>
+            <a:ext cx="360000" cy="216000"/>
+          </a:xfrm>
+          <a:prstGeom prst="rect">
+            <a:avLst/>
+          </a:prstGeom>
+          <a:solidFill>
+            <a:schemeClr val="bg1">
+              <a:lumMod val="65000"/>
+            </a:schemeClr>
+          </a:solidFill>
+          <a:ln w="25400">
+            <a:solidFill>
+              <a:schemeClr val="tx1"/>
+            </a:solidFill>
+          </a:ln>
+        </p:spPr>
+        <p:txBody>
+          <a:bodyPr wrap="square" rtlCol="0">
+            <a:spAutoFit/>
+          </a:bodyPr>
+          <a:lstStyle/>
+          <a:p>
+            <a:endParaRPr lang="zh-CN" altLang="en-US" sz="2000" b="1" dirty="0">
+              <a:latin typeface="等线" panose="02010600030101010101" pitchFamily="2" charset="-122"/>
+              <a:ea typeface="等线" panose="02010600030101010101" pitchFamily="2" charset="-122"/>
+            </a:endParaRPr>
+          </a:p>
+        </p:txBody>
+      </p:sp>
+      <p:sp>
+        <p:nvSpPr>
+          <p:cNvPr id="142" name="文本框 141"/>
+          <p:cNvSpPr txBox="1"/>
+          <p:nvPr/>
+        </p:nvSpPr>
+        <p:spPr>
+          <a:xfrm>
+            <a:off x="7091280" y="4359016"/>
+            <a:ext cx="360000" cy="216000"/>
+          </a:xfrm>
+          <a:prstGeom prst="rect">
+            <a:avLst/>
+          </a:prstGeom>
+          <a:solidFill>
+            <a:srgbClr val="EB6C6B"/>
+          </a:solidFill>
+          <a:ln w="25400">
+            <a:solidFill>
+              <a:schemeClr val="tx1"/>
+            </a:solidFill>
+          </a:ln>
+        </p:spPr>
+        <p:txBody>
+          <a:bodyPr wrap="square" rtlCol="0">
+            <a:spAutoFit/>
+          </a:bodyPr>
+          <a:lstStyle/>
+          <a:p>
+            <a:endParaRPr lang="zh-CN" altLang="en-US" sz="2000" b="1" dirty="0">
+              <a:latin typeface="等线" panose="02010600030101010101" pitchFamily="2" charset="-122"/>
+              <a:ea typeface="等线" panose="02010600030101010101" pitchFamily="2" charset="-122"/>
+            </a:endParaRPr>
+          </a:p>
+        </p:txBody>
+      </p:sp>
+      <p:sp>
+        <p:nvSpPr>
+          <p:cNvPr id="71" name="等腰三角形 70"/>
+          <p:cNvSpPr/>
+          <p:nvPr/>
+        </p:nvSpPr>
+        <p:spPr>
+          <a:xfrm flipV="1">
+            <a:off x="9784279" y="2394696"/>
+            <a:ext cx="189031" cy="173217"/>
+          </a:xfrm>
+          <a:prstGeom prst="triangle">
+            <a:avLst/>
+          </a:prstGeom>
+          <a:solidFill>
+            <a:schemeClr val="tx1"/>
+          </a:solidFill>
+        </p:spPr>
+        <p:style>
+          <a:lnRef idx="2">
+            <a:schemeClr val="accent1">
+              <a:shade val="50000"/>
+            </a:schemeClr>
+          </a:lnRef>
+          <a:fillRef idx="1">
+            <a:schemeClr val="accent1"/>
+          </a:fillRef>
+          <a:effectRef idx="0">
+            <a:schemeClr val="accent1"/>
+          </a:effectRef>
+          <a:fontRef idx="minor">
+            <a:schemeClr val="lt1"/>
+          </a:fontRef>
+        </p:style>
+        <p:txBody>
+          <a:bodyPr rtlCol="0" anchor="ctr"/>
+          <a:lstStyle/>
+          <a:p>
+            <a:pPr algn="ctr"/>
+            <a:endParaRPr lang="zh-CN" altLang="en-US"/>
+          </a:p>
+        </p:txBody>
+      </p:sp>
+      <p:sp>
+        <p:nvSpPr>
+          <p:cNvPr id="143" name="文本框 142"/>
+          <p:cNvSpPr txBox="1"/>
+          <p:nvPr/>
+        </p:nvSpPr>
+        <p:spPr>
+          <a:xfrm>
+            <a:off x="2343910" y="3663392"/>
+            <a:ext cx="2283631" cy="338554"/>
+          </a:xfrm>
+          <a:prstGeom prst="rect">
+            <a:avLst/>
+          </a:prstGeom>
+          <a:solidFill>
+            <a:srgbClr val="E9DDBD"/>
+          </a:solidFill>
+          <a:ln w="38100">
+            <a:solidFill>
+              <a:schemeClr val="tx1"/>
+            </a:solidFill>
+          </a:ln>
+        </p:spPr>
+        <p:txBody>
+          <a:bodyPr wrap="square" rtlCol="0">
+            <a:spAutoFit/>
+          </a:bodyPr>
+          <a:lstStyle/>
+          <a:p>
+            <a:r>
+              <a:rPr lang="en-US" altLang="zh-CN" sz="1600" b="1" dirty="0" smtClean="0">
+                <a:latin typeface="等线" panose="02010600030101010101" pitchFamily="2" charset="-122"/>
+                <a:ea typeface="等线" panose="02010600030101010101" pitchFamily="2" charset="-122"/>
+              </a:rPr>
+              <a:t>search</a:t>
+            </a:r>
+            <a:endParaRPr lang="zh-CN" altLang="en-US" sz="1600" b="1" dirty="0">
+              <a:latin typeface="等线" panose="02010600030101010101" pitchFamily="2" charset="-122"/>
+              <a:ea typeface="等线" panose="02010600030101010101" pitchFamily="2" charset="-122"/>
+            </a:endParaRPr>
+          </a:p>
+        </p:txBody>
+      </p:sp>
+      <p:sp>
+        <p:nvSpPr>
+          <p:cNvPr id="144" name="等腰三角形 143"/>
+          <p:cNvSpPr/>
+          <p:nvPr/>
+        </p:nvSpPr>
+        <p:spPr>
+          <a:xfrm flipV="1">
+            <a:off x="4360303" y="3761642"/>
+            <a:ext cx="189031" cy="173217"/>
+          </a:xfrm>
+          <a:prstGeom prst="triangle">
+            <a:avLst/>
+          </a:prstGeom>
+          <a:solidFill>
+            <a:schemeClr val="tx1"/>
+          </a:solidFill>
+        </p:spPr>
+        <p:style>
+          <a:lnRef idx="2">
+            <a:schemeClr val="accent1">
+              <a:shade val="50000"/>
+            </a:schemeClr>
+          </a:lnRef>
+          <a:fillRef idx="1">
+            <a:schemeClr val="accent1"/>
+          </a:fillRef>
+          <a:effectRef idx="0">
+            <a:schemeClr val="accent1"/>
+          </a:effectRef>
+          <a:fontRef idx="minor">
+            <a:schemeClr val="lt1"/>
+          </a:fontRef>
+        </p:style>
+        <p:txBody>
+          <a:bodyPr rtlCol="0" anchor="ctr"/>
+          <a:lstStyle/>
+          <a:p>
+            <a:pPr algn="ctr"/>
+            <a:endParaRPr lang="zh-CN" altLang="en-US"/>
           </a:p>
         </p:txBody>
       </p:sp>

</xml_diff>